<commit_message>
YOLO2COCO and COCO2YOLO converters are added
</commit_message>
<xml_diff>
--- a/doc/Vis.pptx
+++ b/doc/Vis.pptx
@@ -243,7 +243,7 @@
           <a:p>
             <a:fld id="{664AF2A2-4D9C-46C3-93C3-53C18D916633}" type="datetimeFigureOut">
               <a:rPr lang="ru-RU" smtClean="0"/>
-              <a:t>23.01.2019</a:t>
+              <a:t>19.08.2021</a:t>
             </a:fld>
             <a:endParaRPr lang="ru-RU"/>
           </a:p>
@@ -413,7 +413,7 @@
           <a:p>
             <a:fld id="{664AF2A2-4D9C-46C3-93C3-53C18D916633}" type="datetimeFigureOut">
               <a:rPr lang="ru-RU" smtClean="0"/>
-              <a:t>23.01.2019</a:t>
+              <a:t>19.08.2021</a:t>
             </a:fld>
             <a:endParaRPr lang="ru-RU"/>
           </a:p>
@@ -593,7 +593,7 @@
           <a:p>
             <a:fld id="{664AF2A2-4D9C-46C3-93C3-53C18D916633}" type="datetimeFigureOut">
               <a:rPr lang="ru-RU" smtClean="0"/>
-              <a:t>23.01.2019</a:t>
+              <a:t>19.08.2021</a:t>
             </a:fld>
             <a:endParaRPr lang="ru-RU"/>
           </a:p>
@@ -763,7 +763,7 @@
           <a:p>
             <a:fld id="{664AF2A2-4D9C-46C3-93C3-53C18D916633}" type="datetimeFigureOut">
               <a:rPr lang="ru-RU" smtClean="0"/>
-              <a:t>23.01.2019</a:t>
+              <a:t>19.08.2021</a:t>
             </a:fld>
             <a:endParaRPr lang="ru-RU"/>
           </a:p>
@@ -1009,7 +1009,7 @@
           <a:p>
             <a:fld id="{664AF2A2-4D9C-46C3-93C3-53C18D916633}" type="datetimeFigureOut">
               <a:rPr lang="ru-RU" smtClean="0"/>
-              <a:t>23.01.2019</a:t>
+              <a:t>19.08.2021</a:t>
             </a:fld>
             <a:endParaRPr lang="ru-RU"/>
           </a:p>
@@ -1241,7 +1241,7 @@
           <a:p>
             <a:fld id="{664AF2A2-4D9C-46C3-93C3-53C18D916633}" type="datetimeFigureOut">
               <a:rPr lang="ru-RU" smtClean="0"/>
-              <a:t>23.01.2019</a:t>
+              <a:t>19.08.2021</a:t>
             </a:fld>
             <a:endParaRPr lang="ru-RU"/>
           </a:p>
@@ -1608,7 +1608,7 @@
           <a:p>
             <a:fld id="{664AF2A2-4D9C-46C3-93C3-53C18D916633}" type="datetimeFigureOut">
               <a:rPr lang="ru-RU" smtClean="0"/>
-              <a:t>23.01.2019</a:t>
+              <a:t>19.08.2021</a:t>
             </a:fld>
             <a:endParaRPr lang="ru-RU"/>
           </a:p>
@@ -1726,7 +1726,7 @@
           <a:p>
             <a:fld id="{664AF2A2-4D9C-46C3-93C3-53C18D916633}" type="datetimeFigureOut">
               <a:rPr lang="ru-RU" smtClean="0"/>
-              <a:t>23.01.2019</a:t>
+              <a:t>19.08.2021</a:t>
             </a:fld>
             <a:endParaRPr lang="ru-RU"/>
           </a:p>
@@ -1821,7 +1821,7 @@
           <a:p>
             <a:fld id="{664AF2A2-4D9C-46C3-93C3-53C18D916633}" type="datetimeFigureOut">
               <a:rPr lang="ru-RU" smtClean="0"/>
-              <a:t>23.01.2019</a:t>
+              <a:t>19.08.2021</a:t>
             </a:fld>
             <a:endParaRPr lang="ru-RU"/>
           </a:p>
@@ -2098,7 +2098,7 @@
           <a:p>
             <a:fld id="{664AF2A2-4D9C-46C3-93C3-53C18D916633}" type="datetimeFigureOut">
               <a:rPr lang="ru-RU" smtClean="0"/>
-              <a:t>23.01.2019</a:t>
+              <a:t>19.08.2021</a:t>
             </a:fld>
             <a:endParaRPr lang="ru-RU"/>
           </a:p>
@@ -2351,7 +2351,7 @@
           <a:p>
             <a:fld id="{664AF2A2-4D9C-46C3-93C3-53C18D916633}" type="datetimeFigureOut">
               <a:rPr lang="ru-RU" smtClean="0"/>
-              <a:t>23.01.2019</a:t>
+              <a:t>19.08.2021</a:t>
             </a:fld>
             <a:endParaRPr lang="ru-RU"/>
           </a:p>
@@ -2564,7 +2564,7 @@
           <a:p>
             <a:fld id="{664AF2A2-4D9C-46C3-93C3-53C18D916633}" type="datetimeFigureOut">
               <a:rPr lang="ru-RU" smtClean="0"/>
-              <a:t>23.01.2019</a:t>
+              <a:t>19.08.2021</a:t>
             </a:fld>
             <a:endParaRPr lang="ru-RU"/>
           </a:p>
@@ -3262,7 +3262,7 @@
         </p:nvSpPr>
         <p:spPr>
           <a:xfrm>
-            <a:off x="6561433" y="2022120"/>
+            <a:off x="6561428" y="1806139"/>
             <a:ext cx="1744363" cy="225513"/>
           </a:xfrm>
           <a:prstGeom prst="rect">
@@ -3336,8 +3336,8 @@
         </p:nvCxnSpPr>
         <p:spPr>
           <a:xfrm flipH="1">
-            <a:off x="5385484" y="2134877"/>
-            <a:ext cx="1175949" cy="9532"/>
+            <a:off x="5385484" y="1918896"/>
+            <a:ext cx="1175944" cy="225513"/>
           </a:xfrm>
           <a:prstGeom prst="straightConnector1">
             <a:avLst/>
@@ -4202,6 +4202,114 @@
           </a:prstGeom>
           <a:ln>
             <a:tailEnd type="triangle"/>
+          </a:ln>
+        </p:spPr>
+        <p:style>
+          <a:lnRef idx="1">
+            <a:schemeClr val="accent1"/>
+          </a:lnRef>
+          <a:fillRef idx="0">
+            <a:schemeClr val="accent1"/>
+          </a:fillRef>
+          <a:effectRef idx="0">
+            <a:schemeClr val="accent1"/>
+          </a:effectRef>
+          <a:fontRef idx="minor">
+            <a:schemeClr val="tx1"/>
+          </a:fontRef>
+        </p:style>
+      </p:cxnSp>
+      <p:sp>
+        <p:nvSpPr>
+          <p:cNvPr id="27" name="Прямоугольник 26"/>
+          <p:cNvSpPr/>
+          <p:nvPr/>
+        </p:nvSpPr>
+        <p:spPr>
+          <a:xfrm>
+            <a:off x="6561428" y="2214165"/>
+            <a:ext cx="1744363" cy="225513"/>
+          </a:xfrm>
+          <a:prstGeom prst="rect">
+            <a:avLst/>
+          </a:prstGeom>
+          <a:solidFill>
+            <a:schemeClr val="bg1"/>
+          </a:solidFill>
+        </p:spPr>
+        <p:style>
+          <a:lnRef idx="2">
+            <a:schemeClr val="accent1">
+              <a:shade val="50000"/>
+            </a:schemeClr>
+          </a:lnRef>
+          <a:fillRef idx="1">
+            <a:schemeClr val="accent1"/>
+          </a:fillRef>
+          <a:effectRef idx="0">
+            <a:schemeClr val="accent1"/>
+          </a:effectRef>
+          <a:fontRef idx="minor">
+            <a:schemeClr val="lt1"/>
+          </a:fontRef>
+        </p:style>
+        <p:txBody>
+          <a:bodyPr rtlCol="0" anchor="ctr"/>
+          <a:lstStyle/>
+          <a:p>
+            <a:pPr algn="ctr"/>
+            <a:r>
+              <a:rPr lang="en-US" sz="1200" dirty="0" smtClean="0">
+                <a:ln w="0"/>
+                <a:solidFill>
+                  <a:schemeClr val="tx1"/>
+                </a:solidFill>
+                <a:effectLst>
+                  <a:outerShdw blurRad="38100" dist="19050" dir="2700000" algn="tl" rotWithShape="0">
+                    <a:schemeClr val="dk1">
+                      <a:alpha val="40000"/>
+                    </a:schemeClr>
+                  </a:outerShdw>
+                </a:effectLst>
+              </a:rPr>
+              <a:t>YOLO</a:t>
+            </a:r>
+            <a:endParaRPr lang="ru-RU" sz="1200" dirty="0">
+              <a:ln w="0"/>
+              <a:solidFill>
+                <a:schemeClr val="tx1"/>
+              </a:solidFill>
+              <a:effectLst>
+                <a:outerShdw blurRad="38100" dist="19050" dir="2700000" algn="tl" rotWithShape="0">
+                  <a:schemeClr val="dk1">
+                    <a:alpha val="40000"/>
+                  </a:schemeClr>
+                </a:outerShdw>
+              </a:effectLst>
+            </a:endParaRPr>
+          </a:p>
+        </p:txBody>
+      </p:sp>
+      <p:cxnSp>
+        <p:nvCxnSpPr>
+          <p:cNvPr id="31" name="Прямая со стрелкой 30"/>
+          <p:cNvCxnSpPr>
+            <a:stCxn id="27" idx="1"/>
+            <a:endCxn id="4" idx="3"/>
+          </p:cNvCxnSpPr>
+          <p:nvPr/>
+        </p:nvCxnSpPr>
+        <p:spPr>
+          <a:xfrm flipH="1" flipV="1">
+            <a:off x="5385484" y="2144409"/>
+            <a:ext cx="1175944" cy="182513"/>
+          </a:xfrm>
+          <a:prstGeom prst="straightConnector1">
+            <a:avLst/>
+          </a:prstGeom>
+          <a:ln>
+            <a:headEnd type="triangle" w="med" len="med"/>
+            <a:tailEnd type="triangle" w="med" len="med"/>
           </a:ln>
         </p:spPr>
         <p:style>

</xml_diff>